<commit_message>
Report of Battle of neighborhoods- capstone project
This PPT contains a full report on the capstone project of Battle of Neighborhood. Summarized the way two boroughs of international financial hubs vernues are compared and thus helps user make a informed decision..
</commit_message>
<xml_diff>
--- a/BattleofNeighborhood.pptx
+++ b/BattleofNeighborhood.pptx
@@ -112,6 +112,11 @@
       </a:defRPr>
     </a:lvl9pPr>
   </p:defaultTextStyle>
+  <p:extLst>
+    <p:ext uri="{EFAFB233-063F-42B5-8137-9DF3F51BA10A}">
+      <p15:sldGuideLst xmlns:p15="http://schemas.microsoft.com/office/powerpoint/2012/main"/>
+    </p:ext>
+  </p:extLst>
 </p:presentation>
 </file>
 
@@ -389,7 +394,7 @@
           <a:p>
             <a:fld id="{78ABE3C1-DBE1-495D-B57B-2849774B866A}" type="datetimeFigureOut">
               <a:rPr lang="en-US" dirty="0"/>
-              <a:t>9/3/19</a:t>
+              <a:t>9/3/2019</a:t>
             </a:fld>
             <a:endParaRPr lang="en-US" dirty="0"/>
           </a:p>
@@ -798,7 +803,7 @@
           <a:p>
             <a:fld id="{446C117F-5CCF-4837-BE5F-2B92066CAFAF}" type="datetimeFigureOut">
               <a:rPr lang="en-US" dirty="0"/>
-              <a:t>9/3/19</a:t>
+              <a:t>9/3/2019</a:t>
             </a:fld>
             <a:endParaRPr lang="en-US" dirty="0"/>
           </a:p>
@@ -1129,7 +1134,7 @@
           <a:p>
             <a:fld id="{84EB90BD-B6CE-46B7-997F-7313B992CCDC}" type="datetimeFigureOut">
               <a:rPr lang="en-US" dirty="0"/>
-              <a:t>9/3/19</a:t>
+              <a:t>9/3/2019</a:t>
             </a:fld>
             <a:endParaRPr lang="en-US" dirty="0"/>
           </a:p>
@@ -1529,7 +1534,7 @@
           <a:p>
             <a:fld id="{CDB9D11F-B188-461D-B23F-39381795C052}" type="datetimeFigureOut">
               <a:rPr lang="en-US" dirty="0"/>
-              <a:t>9/3/19</a:t>
+              <a:t>9/3/2019</a:t>
             </a:fld>
             <a:endParaRPr lang="en-US" dirty="0"/>
           </a:p>
@@ -2092,7 +2097,7 @@
           <a:p>
             <a:fld id="{52E6D8D9-55A2-4063-B0F3-121F44549695}" type="datetimeFigureOut">
               <a:rPr lang="en-US" dirty="0"/>
-              <a:t>9/3/19</a:t>
+              <a:t>9/3/2019</a:t>
             </a:fld>
             <a:endParaRPr lang="en-US" dirty="0"/>
           </a:p>
@@ -2768,7 +2773,7 @@
           <a:p>
             <a:fld id="{D4B24536-994D-4021-A283-9F449C0DB509}" type="datetimeFigureOut">
               <a:rPr lang="en-US" dirty="0"/>
-              <a:t>9/3/19</a:t>
+              <a:t>9/3/2019</a:t>
             </a:fld>
             <a:endParaRPr lang="en-US" dirty="0"/>
           </a:p>
@@ -3676,7 +3681,7 @@
           <a:p>
             <a:fld id="{3CBBBB78-C96F-47B7-AB17-D852CA960AC9}" type="datetimeFigureOut">
               <a:rPr lang="en-US" dirty="0"/>
-              <a:t>9/3/19</a:t>
+              <a:t>9/3/2019</a:t>
             </a:fld>
             <a:endParaRPr lang="en-US" dirty="0"/>
           </a:p>
@@ -3984,7 +3989,7 @@
           <a:p>
             <a:fld id="{1FA3F48C-C7C6-4055-9F49-3777875E72AE}" type="datetimeFigureOut">
               <a:rPr lang="en-US" dirty="0"/>
-              <a:t>9/3/19</a:t>
+              <a:t>9/3/2019</a:t>
             </a:fld>
             <a:endParaRPr lang="en-US" dirty="0"/>
           </a:p>
@@ -4243,7 +4248,7 @@
           <a:p>
             <a:fld id="{6178E61D-D431-422C-9764-11DAFE33AB63}" type="datetimeFigureOut">
               <a:rPr lang="en-US" dirty="0"/>
-              <a:t>9/3/19</a:t>
+              <a:t>9/3/2019</a:t>
             </a:fld>
             <a:endParaRPr lang="en-US" dirty="0"/>
           </a:p>
@@ -4562,7 +4567,7 @@
           <a:p>
             <a:fld id="{12DE42F4-6EEF-4EF7-8ED4-2208F0F89A08}" type="datetimeFigureOut">
               <a:rPr lang="en-US" dirty="0"/>
-              <a:t>9/3/19</a:t>
+              <a:t>9/3/2019</a:t>
             </a:fld>
             <a:endParaRPr lang="en-US" dirty="0"/>
           </a:p>
@@ -4946,7 +4951,7 @@
           <a:p>
             <a:fld id="{30578ACC-22D6-47C1-A373-4FD133E34F3C}" type="datetimeFigureOut">
               <a:rPr lang="en-US" dirty="0"/>
-              <a:t>9/3/19</a:t>
+              <a:t>9/3/2019</a:t>
             </a:fld>
             <a:endParaRPr lang="en-US" dirty="0"/>
           </a:p>
@@ -5317,7 +5322,7 @@
           <a:p>
             <a:fld id="{4E5A6C69-6797-4E8A-BF37-F2C3751466E9}" type="datetimeFigureOut">
               <a:rPr lang="en-US" dirty="0"/>
-              <a:t>9/3/19</a:t>
+              <a:t>9/3/2019</a:t>
             </a:fld>
             <a:endParaRPr lang="en-US" dirty="0"/>
           </a:p>
@@ -5818,7 +5823,7 @@
           <a:p>
             <a:fld id="{D82014A1-A632-4878-A0D3-F52BA7563730}" type="datetimeFigureOut">
               <a:rPr lang="en-US" dirty="0"/>
-              <a:t>9/3/19</a:t>
+              <a:t>9/3/2019</a:t>
             </a:fld>
             <a:endParaRPr lang="en-US" dirty="0"/>
           </a:p>
@@ -6070,7 +6075,7 @@
           <a:p>
             <a:fld id="{CE99F462-093F-4566-844B-4C71F2739DA5}" type="datetimeFigureOut">
               <a:rPr lang="en-US" dirty="0"/>
-              <a:t>9/3/19</a:t>
+              <a:t>9/3/2019</a:t>
             </a:fld>
             <a:endParaRPr lang="en-US" dirty="0"/>
           </a:p>
@@ -6228,7 +6233,7 @@
           <a:p>
             <a:fld id="{3D24A7AC-904D-4781-85BA-7D10C17ED021}" type="datetimeFigureOut">
               <a:rPr lang="en-US" dirty="0"/>
-              <a:t>9/3/19</a:t>
+              <a:t>9/3/2019</a:t>
             </a:fld>
             <a:endParaRPr lang="en-US" dirty="0"/>
           </a:p>
@@ -6613,7 +6618,7 @@
           <a:p>
             <a:fld id="{E331444B-B92B-4E27-8C94-BB93EAF5CB18}" type="datetimeFigureOut">
               <a:rPr lang="en-US" dirty="0"/>
-              <a:t>9/3/19</a:t>
+              <a:t>9/3/2019</a:t>
             </a:fld>
             <a:endParaRPr lang="en-US" dirty="0"/>
           </a:p>
@@ -7017,7 +7022,7 @@
           <a:p>
             <a:fld id="{363EFA5E-FA76-400D-B3DC-F0BA90E6D107}" type="datetimeFigureOut">
               <a:rPr lang="en-US" dirty="0"/>
-              <a:t>9/3/19</a:t>
+              <a:t>9/3/2019</a:t>
             </a:fld>
             <a:endParaRPr lang="en-US" dirty="0"/>
           </a:p>
@@ -7256,7 +7261,7 @@
           <a:p>
             <a:fld id="{9D6E9DEC-419B-4CC5-A080-3B06BD5A8291}" type="datetimeFigureOut">
               <a:rPr lang="en-US" dirty="0"/>
-              <a:t>9/3/19</a:t>
+              <a:t>9/3/2019</a:t>
             </a:fld>
             <a:endParaRPr lang="en-US" dirty="0"/>
           </a:p>
@@ -8109,6 +8114,10 @@
               </a:rPr>
               <a:t> </a:t>
             </a:r>
+            <a:r>
+              <a:rPr lang="en-US" dirty="0"/>
+              <a:t/>
+            </a:r>
             <a:br>
               <a:rPr lang="en-US" dirty="0"/>
             </a:br>
@@ -8390,7 +8399,7 @@
         </p:blipFill>
         <p:spPr bwMode="auto">
           <a:xfrm>
-            <a:off x="772652" y="2726807"/>
+            <a:off x="772652" y="2635778"/>
             <a:ext cx="3152641" cy="1404386"/>
           </a:xfrm>
           <a:prstGeom prst="rect">
@@ -8437,7 +8446,7 @@
         </p:blipFill>
         <p:spPr bwMode="auto">
           <a:xfrm>
-            <a:off x="4399888" y="2726807"/>
+            <a:off x="4399888" y="2635778"/>
             <a:ext cx="3152641" cy="1404385"/>
           </a:xfrm>
           <a:prstGeom prst="rect">
@@ -8578,6 +8587,12 @@
                 <a:latin typeface="Segoe UI"/>
               </a:rPr>
               <a:t>Geospatial_Coordinates.csv</a:t>
+            </a:r>
+            <a:r>
+              <a:rPr lang="en-US" sz="1400" dirty="0">
+                <a:latin typeface="Segoe UI"/>
+              </a:rPr>
+              <a:t/>
             </a:r>
             <a:br>
               <a:rPr lang="en-US" sz="1400" dirty="0">

</xml_diff>